<commit_message>
Fixed link to Escali Oxygen plugin
</commit_message>
<xml_diff>
--- a/SQF-Escali.pptx
+++ b/SQF-Escali.pptx
@@ -12731,15 +12731,6 @@
               </a:rPr>
               <a:t>Eine ID muss der Hierarchie, der Position und/oder dem Inhalt entsprechend </a:t>
             </a:r>
-            <a:r>
-              <a:rPr lang="de-DE" sz="1600" noProof="0" dirty="0" smtClean="0">
-                <a:solidFill>
-                  <a:srgbClr val="000000"/>
-                </a:solidFill>
-                <a:latin typeface="Arial" charset="0"/>
-              </a:rPr>
-              <a:t/>
-            </a:r>
             <a:br>
               <a:rPr lang="de-DE" sz="1600" noProof="0" dirty="0" smtClean="0">
                 <a:solidFill>
@@ -12755,16 +12746,7 @@
                 </a:solidFill>
                 <a:latin typeface="Arial" charset="0"/>
               </a:rPr>
-              <a:t>gesetzt </a:t>
-            </a:r>
-            <a:r>
-              <a:rPr lang="de-DE" sz="1600" noProof="0" dirty="0" smtClean="0">
-                <a:solidFill>
-                  <a:srgbClr val="000000"/>
-                </a:solidFill>
-                <a:latin typeface="Arial" charset="0"/>
-              </a:rPr>
-              <a:t>werden</a:t>
+              <a:t>gesetzt werden</a:t>
             </a:r>
           </a:p>
           <a:p>
@@ -12804,25 +12786,7 @@
                 </a:solidFill>
                 <a:latin typeface="Arial" charset="0"/>
               </a:rPr>
-              <a:t>) </a:t>
-            </a:r>
-            <a:r>
-              <a:rPr lang="de-DE" sz="1600" noProof="0" dirty="0" smtClean="0">
-                <a:solidFill>
-                  <a:srgbClr val="000000"/>
-                </a:solidFill>
-                <a:latin typeface="Arial" charset="0"/>
-              </a:rPr>
-              <a:t>haben Auswirkungen auf die </a:t>
-            </a:r>
-            <a:r>
-              <a:rPr lang="de-DE" sz="1600" noProof="0" dirty="0" smtClean="0">
-                <a:solidFill>
-                  <a:srgbClr val="000000"/>
-                </a:solidFill>
-                <a:latin typeface="Arial" charset="0"/>
-              </a:rPr>
-              <a:t/>
+              <a:t>) haben Auswirkungen auf die </a:t>
             </a:r>
             <a:br>
               <a:rPr lang="de-DE" sz="1600" noProof="0" dirty="0" smtClean="0">
@@ -12839,16 +12803,7 @@
                 </a:solidFill>
                 <a:latin typeface="Arial" charset="0"/>
               </a:rPr>
-              <a:t>Struktur </a:t>
-            </a:r>
-            <a:r>
-              <a:rPr lang="de-DE" sz="1600" noProof="0" dirty="0" smtClean="0">
-                <a:solidFill>
-                  <a:srgbClr val="000000"/>
-                </a:solidFill>
-                <a:latin typeface="Arial" charset="0"/>
-              </a:rPr>
-              <a:t>des Dokuments</a:t>
+              <a:t>Struktur des Dokuments</a:t>
             </a:r>
           </a:p>
           <a:p>
@@ -13896,16 +13851,7 @@
                 </a:solidFill>
                 <a:latin typeface="Arial" charset="0"/>
               </a:rPr>
-              <a:t>Standardisiert mit einer W3C-Note</a:t>
-            </a:r>
-            <a:r>
-              <a:rPr lang="de-DE" sz="1600" noProof="0" dirty="0" smtClean="0">
-                <a:solidFill>
-                  <a:srgbClr val="000000"/>
-                </a:solidFill>
-                <a:latin typeface="Arial" charset="0"/>
-              </a:rPr>
-              <a:t>:</a:t>
+              <a:t>Standardisiert mit einer W3C-Note:</a:t>
             </a:r>
             <a:endParaRPr lang="de-DE" sz="1200" noProof="0" dirty="0" smtClean="0">
               <a:solidFill>
@@ -13987,16 +13933,7 @@
                 </a:solidFill>
                 <a:latin typeface="Arial" charset="0"/>
               </a:rPr>
-              <a:t>Ersetze die fehlerhafte ID durch eine aus dem Kontext heraus kalkulierte </a:t>
-            </a:r>
-            <a:r>
-              <a:rPr lang="de-DE" sz="1600" noProof="0" dirty="0" smtClean="0">
-                <a:solidFill>
-                  <a:srgbClr val="000000"/>
-                </a:solidFill>
-                <a:latin typeface="Arial" charset="0"/>
-              </a:rPr>
-              <a:t>ID</a:t>
+              <a:t>Ersetze die fehlerhafte ID durch eine aus dem Kontext heraus kalkulierte ID</a:t>
             </a:r>
           </a:p>
           <a:p>
@@ -14038,16 +13975,7 @@
                 </a:solidFill>
                 <a:latin typeface="Arial" charset="0"/>
               </a:rPr>
-              <a:t>Konvertiere </a:t>
-            </a:r>
-            <a:r>
-              <a:rPr lang="de-DE" sz="1600" noProof="0" dirty="0" smtClean="0">
-                <a:solidFill>
-                  <a:srgbClr val="000000"/>
-                </a:solidFill>
-                <a:latin typeface="Arial" charset="0"/>
-              </a:rPr>
-              <a:t>fehlerhaftes Datumsformat in </a:t>
+              <a:t>Konvertiere fehlerhaftes Datumsformat in </a:t>
             </a:r>
             <a:r>
               <a:rPr lang="de-DE" sz="1600" noProof="0" dirty="0" err="1" smtClean="0">
@@ -15201,7 +15129,7 @@
         <p:spPr>
           <a:xfrm>
             <a:off x="936633" y="1145704"/>
-            <a:ext cx="7190581" cy="5472608"/>
+            <a:ext cx="7815775" cy="5472608"/>
           </a:xfrm>
         </p:spPr>
         <p:txBody>
@@ -15419,7 +15347,7 @@
                 <a:latin typeface="Arial" charset="0"/>
                 <a:hlinkClick r:id="rId3"/>
               </a:rPr>
-              <a:t>https://github.com/schematron-quickfix/escali-package/</a:t>
+              <a:t>https://github.com/schematron-quickfix/escali-package/tree/master/escaliOxygen</a:t>
             </a:r>
             <a:endParaRPr lang="de-DE" sz="1200" noProof="0" dirty="0" smtClean="0">
               <a:solidFill>

</xml_diff>

<commit_message>
PDF version updated, added printable versions of some slides
</commit_message>
<xml_diff>
--- a/SQF-Escali.pptx
+++ b/SQF-Escali.pptx
@@ -294,7 +294,7 @@
           <a:p>
             <a:fld id="{D47D8A5B-AC4C-43B8-8900-F35950A2270E}" type="datetimeFigureOut">
               <a:rPr lang="de-DE" smtClean="0"/>
-              <a:t>25.11.2017</a:t>
+              <a:t>29.11.2017</a:t>
             </a:fld>
             <a:endParaRPr lang="de-DE"/>
           </a:p>
@@ -6319,7 +6319,7 @@
                 </a:solidFill>
                 <a:latin typeface="TheSansOffice" pitchFamily="34" charset="0"/>
               </a:rPr>
-              <a:t>Samstag, 25. November 2017</a:t>
+              <a:t>Mittwoch, 29. November 2017</a:t>
             </a:fld>
             <a:endParaRPr lang="de-DE" sz="2000" b="1" i="1" dirty="0">
               <a:solidFill>
@@ -6362,29 +6362,7 @@
                 <a:ea typeface="+mj-ea"/>
                 <a:cs typeface="+mj-cs"/>
               </a:rPr>
-              <a:t>Vergleich </a:t>
-            </a:r>
-            <a:r>
-              <a:rPr lang="de-DE" sz="1800" b="1" kern="0" dirty="0">
-                <a:solidFill>
-                  <a:srgbClr val="000077"/>
-                </a:solidFill>
-                <a:latin typeface="TheSansOffice" pitchFamily="34" charset="0"/>
-                <a:ea typeface="+mj-ea"/>
-                <a:cs typeface="+mj-cs"/>
-              </a:rPr>
-              <a:t>zwei </a:t>
-            </a:r>
-            <a:r>
-              <a:rPr lang="de-DE" sz="1800" b="1" kern="0" dirty="0">
-                <a:solidFill>
-                  <a:srgbClr val="000077"/>
-                </a:solidFill>
-                <a:latin typeface="TheSansOffice" pitchFamily="34" charset="0"/>
-                <a:ea typeface="+mj-ea"/>
-                <a:cs typeface="+mj-cs"/>
-              </a:rPr>
-              <a:t>verschiedener Implementierungen</a:t>
+              <a:t>Vergleich zwei verschiedener Implementierungen</a:t>
             </a:r>
             <a:endParaRPr lang="de-DE" dirty="0"/>
           </a:p>
@@ -7157,9 +7135,6 @@
               </a:rPr>
               <a:t> – Fallunterscheidungen</a:t>
             </a:r>
-            <a:endParaRPr lang="de-DE" sz="3600" dirty="0">
-              <a:latin typeface="TheSansOffice" pitchFamily="34" charset="0"/>
-            </a:endParaRPr>
           </a:p>
         </p:txBody>
       </p:sp>
@@ -8223,14 +8198,6 @@
               </a:rPr>
               <a:t>Die Oxygen-Implementierung</a:t>
             </a:r>
-            <a:endParaRPr lang="de-DE" sz="3600" b="1" dirty="0">
-              <a:solidFill>
-                <a:srgbClr val="000077"/>
-              </a:solidFill>
-              <a:latin typeface="TheSansOffice" pitchFamily="34" charset="0"/>
-              <a:ea typeface="+mj-ea"/>
-              <a:cs typeface="+mj-cs"/>
-            </a:endParaRPr>
           </a:p>
         </p:txBody>
       </p:sp>
@@ -8318,9 +8285,6 @@
               </a:rPr>
               <a:t>-in</a:t>
             </a:r>
-            <a:endParaRPr lang="de-DE" sz="3600" dirty="0">
-              <a:latin typeface="TheSansOffice" pitchFamily="34" charset="0"/>
-            </a:endParaRPr>
           </a:p>
         </p:txBody>
       </p:sp>
@@ -8530,8 +8494,23 @@
                 </a:solidFill>
                 <a:latin typeface="Arial" charset="0"/>
               </a:rPr>
-              <a:t>Features seit 18.1:</a:t>
-            </a:r>
+              <a:t>Features </a:t>
+            </a:r>
+            <a:r>
+              <a:rPr lang="de-DE" sz="2400" dirty="0" smtClean="0">
+                <a:solidFill>
+                  <a:srgbClr val="000000"/>
+                </a:solidFill>
+                <a:latin typeface="Arial" charset="0"/>
+              </a:rPr>
+              <a:t>in 18.1+</a:t>
+            </a:r>
+            <a:endParaRPr lang="de-DE" sz="2400" dirty="0">
+              <a:solidFill>
+                <a:srgbClr val="000000"/>
+              </a:solidFill>
+              <a:latin typeface="Arial" charset="0"/>
+            </a:endParaRPr>
           </a:p>
           <a:p>
             <a:pPr marL="800067" lvl="1" indent="-342878" algn="l">
@@ -9043,7 +9022,7 @@
           <a:graphicData uri="http://schemas.openxmlformats.org/presentationml/2006/ole">
             <mc:AlternateContent xmlns:mc="http://schemas.openxmlformats.org/markup-compatibility/2006">
               <mc:Choice xmlns:v="urn:schemas-microsoft-com:vml" Requires="v">
-                <p:oleObj spid="_x0000_s2074" name="Image" r:id="rId3" imgW="6628320" imgH="1180800" progId="Photoshop.Image.13">
+                <p:oleObj spid="_x0000_s2083" name="Image" r:id="rId3" imgW="6628320" imgH="1180800" progId="Photoshop.Image.13">
                   <p:embed/>
                 </p:oleObj>
               </mc:Choice>
@@ -9100,7 +9079,7 @@
           <a:graphicData uri="http://schemas.openxmlformats.org/presentationml/2006/ole">
             <mc:AlternateContent xmlns:mc="http://schemas.openxmlformats.org/markup-compatibility/2006">
               <mc:Choice xmlns:v="urn:schemas-microsoft-com:vml" Requires="v">
-                <p:oleObj spid="_x0000_s2075" name="Image" r:id="rId5" imgW="6628320" imgH="1180800" progId="Photoshop.Image.13">
+                <p:oleObj spid="_x0000_s2084" name="Image" r:id="rId5" imgW="6628320" imgH="1180800" progId="Photoshop.Image.13">
                   <p:embed/>
                 </p:oleObj>
               </mc:Choice>
@@ -9182,9 +9161,6 @@
               </a:rPr>
               <a:t>-in</a:t>
             </a:r>
-            <a:endParaRPr lang="de-DE" sz="3600" dirty="0">
-              <a:latin typeface="TheSansOffice" pitchFamily="34" charset="0"/>
-            </a:endParaRPr>
           </a:p>
         </p:txBody>
       </p:sp>
@@ -9502,7 +9478,7 @@
           <a:graphicData uri="http://schemas.openxmlformats.org/presentationml/2006/ole">
             <mc:AlternateContent xmlns:mc="http://schemas.openxmlformats.org/markup-compatibility/2006">
               <mc:Choice xmlns:v="urn:schemas-microsoft-com:vml" Requires="v">
-                <p:oleObj spid="_x0000_s2076" name="Image" r:id="rId7" imgW="3809520" imgH="1764720" progId="Photoshop.Image.13">
+                <p:oleObj spid="_x0000_s2085" name="Image" r:id="rId7" imgW="3809520" imgH="1764720" progId="Photoshop.Image.13">
                   <p:embed/>
                 </p:oleObj>
               </mc:Choice>
@@ -10114,9 +10090,6 @@
               </a:rPr>
               <a:t>-Projekt</a:t>
             </a:r>
-            <a:endParaRPr lang="de-DE" sz="3600" dirty="0">
-              <a:latin typeface="TheSansOffice" pitchFamily="34" charset="0"/>
-            </a:endParaRPr>
           </a:p>
         </p:txBody>
       </p:sp>
@@ -11069,9 +11042,6 @@
               </a:rPr>
               <a:t> Module</a:t>
             </a:r>
-            <a:endParaRPr lang="de-DE" sz="3600" dirty="0">
-              <a:latin typeface="TheSansOffice" pitchFamily="34" charset="0"/>
-            </a:endParaRPr>
           </a:p>
         </p:txBody>
       </p:sp>
@@ -11313,9 +11283,6 @@
               </a:rPr>
               <a:t> / Oxygen</a:t>
             </a:r>
-            <a:endParaRPr lang="de-DE" sz="3600" dirty="0">
-              <a:latin typeface="TheSansOffice" pitchFamily="34" charset="0"/>
-            </a:endParaRPr>
           </a:p>
         </p:txBody>
       </p:sp>
@@ -12240,9 +12207,6 @@
               </a:rPr>
               <a:t>Agenda</a:t>
             </a:r>
-            <a:endParaRPr lang="de-DE" sz="3600" dirty="0">
-              <a:latin typeface="TheSansOffice" pitchFamily="34" charset="0"/>
-            </a:endParaRPr>
           </a:p>
         </p:txBody>
       </p:sp>
@@ -13099,9 +13063,6 @@
               </a:rPr>
               <a:t>Setup</a:t>
             </a:r>
-            <a:endParaRPr lang="de-DE" sz="3600" dirty="0">
-              <a:latin typeface="TheSansOffice" pitchFamily="34" charset="0"/>
-            </a:endParaRPr>
           </a:p>
         </p:txBody>
       </p:sp>
@@ -13711,9 +13672,6 @@
               </a:rPr>
               <a:t>Überblick</a:t>
             </a:r>
-            <a:endParaRPr lang="de-DE" sz="3600" dirty="0">
-              <a:latin typeface="TheSansOffice" pitchFamily="34" charset="0"/>
-            </a:endParaRPr>
           </a:p>
         </p:txBody>
       </p:sp>
@@ -14546,9 +14504,6 @@
               </a:rPr>
               <a:t>Konfiguration</a:t>
             </a:r>
-            <a:endParaRPr lang="de-DE" sz="3600" dirty="0">
-              <a:latin typeface="TheSansOffice" pitchFamily="34" charset="0"/>
-            </a:endParaRPr>
           </a:p>
         </p:txBody>
       </p:sp>
@@ -15097,7 +15052,7 @@
           <a:graphicData uri="http://schemas.openxmlformats.org/presentationml/2006/ole">
             <mc:AlternateContent xmlns:mc="http://schemas.openxmlformats.org/markup-compatibility/2006">
               <mc:Choice xmlns:v="urn:schemas-microsoft-com:vml" Requires="v">
-                <p:oleObj spid="_x0000_s1040" name="Image" r:id="rId3" imgW="5765040" imgH="1180800" progId="Photoshop.Image.13">
+                <p:oleObj spid="_x0000_s1046" name="Image" r:id="rId3" imgW="5765040" imgH="1180800" progId="Photoshop.Image.13">
                   <p:embed/>
                 </p:oleObj>
               </mc:Choice>
@@ -15154,7 +15109,7 @@
           <a:graphicData uri="http://schemas.openxmlformats.org/presentationml/2006/ole">
             <mc:AlternateContent xmlns:mc="http://schemas.openxmlformats.org/markup-compatibility/2006">
               <mc:Choice xmlns:v="urn:schemas-microsoft-com:vml" Requires="v">
-                <p:oleObj spid="_x0000_s1041" name="Image" r:id="rId5" imgW="5765040" imgH="1180800" progId="Photoshop.Image.13">
+                <p:oleObj spid="_x0000_s1047" name="Image" r:id="rId5" imgW="5765040" imgH="1180800" progId="Photoshop.Image.13">
                   <p:embed/>
                 </p:oleObj>
               </mc:Choice>
@@ -15296,9 +15251,6 @@
               </a:rPr>
               <a:t>Ausführen von QFs</a:t>
             </a:r>
-            <a:endParaRPr lang="de-DE" sz="3600" dirty="0">
-              <a:latin typeface="TheSansOffice" pitchFamily="34" charset="0"/>
-            </a:endParaRPr>
           </a:p>
         </p:txBody>
       </p:sp>
@@ -16361,14 +16313,6 @@
               </a:rPr>
               <a:t>Der Vergleich</a:t>
             </a:r>
-            <a:endParaRPr lang="de-DE" sz="3600" b="1" dirty="0">
-              <a:solidFill>
-                <a:srgbClr val="000077"/>
-              </a:solidFill>
-              <a:latin typeface="TheSansOffice" pitchFamily="34" charset="0"/>
-              <a:ea typeface="+mj-ea"/>
-              <a:cs typeface="+mj-cs"/>
-            </a:endParaRPr>
           </a:p>
         </p:txBody>
       </p:sp>
@@ -16456,9 +16400,6 @@
               </a:rPr>
               <a:t> auf einmal</a:t>
             </a:r>
-            <a:endParaRPr lang="de-DE" sz="3600" dirty="0">
-              <a:latin typeface="TheSansOffice" pitchFamily="34" charset="0"/>
-            </a:endParaRPr>
           </a:p>
         </p:txBody>
       </p:sp>
@@ -17216,9 +17157,6 @@
               </a:rPr>
               <a:t> – Datentypen</a:t>
             </a:r>
-            <a:endParaRPr lang="de-DE" sz="3600" dirty="0">
-              <a:latin typeface="TheSansOffice" pitchFamily="34" charset="0"/>
-            </a:endParaRPr>
           </a:p>
         </p:txBody>
       </p:sp>
@@ -18723,12 +18661,6 @@
               </a:rPr>
               <a:t> hat.</a:t>
             </a:r>
-            <a:endParaRPr lang="de-DE" sz="1600" dirty="0">
-              <a:solidFill>
-                <a:srgbClr val="000000"/>
-              </a:solidFill>
-              <a:latin typeface="Arial" charset="0"/>
-            </a:endParaRPr>
           </a:p>
         </p:txBody>
       </p:sp>
@@ -19419,12 +19351,6 @@
               </a:rPr>
               <a:t> beim Ausführen der QFs</a:t>
             </a:r>
-            <a:endParaRPr lang="de-DE" sz="1400" dirty="0">
-              <a:solidFill>
-                <a:srgbClr val="000000"/>
-              </a:solidFill>
-              <a:latin typeface="Arial" charset="0"/>
-            </a:endParaRPr>
           </a:p>
           <a:p>
             <a:pPr marL="800067" lvl="1" indent="-342878" algn="l">
@@ -19723,12 +19649,6 @@
               </a:rPr>
               <a:t>Hat bereits angekündigt, diesen Mode wohl vorläufig nicht zu unterstützen.</a:t>
             </a:r>
-            <a:endParaRPr lang="de-DE" sz="1400" dirty="0">
-              <a:solidFill>
-                <a:srgbClr val="000000"/>
-              </a:solidFill>
-              <a:latin typeface="Arial" charset="0"/>
-            </a:endParaRPr>
           </a:p>
           <a:p>
             <a:pPr marL="342878" indent="-342878" algn="l">
@@ -20482,9 +20402,6 @@
               </a:rPr>
               <a:t>Mikrotypographie</a:t>
             </a:r>
-            <a:endParaRPr lang="de-DE" sz="3600" dirty="0">
-              <a:latin typeface="TheSansOffice" pitchFamily="34" charset="0"/>
-            </a:endParaRPr>
           </a:p>
         </p:txBody>
       </p:sp>
@@ -20607,25 +20524,7 @@
                 </a:solidFill>
                 <a:latin typeface="Arial" charset="0"/>
               </a:rPr>
-              <a:t> (einzelne Zeichen, Abkürzungen</a:t>
-            </a:r>
-            <a:r>
-              <a:rPr lang="de-DE" sz="1400" dirty="0">
-                <a:solidFill>
-                  <a:srgbClr val="000000"/>
-                </a:solidFill>
-                <a:latin typeface="Arial" charset="0"/>
-              </a:rPr>
-              <a:t>, </a:t>
-            </a:r>
-            <a:r>
-              <a:rPr lang="de-DE" sz="1400" dirty="0">
-                <a:solidFill>
-                  <a:srgbClr val="000000"/>
-                </a:solidFill>
-                <a:latin typeface="Arial" charset="0"/>
-              </a:rPr>
-              <a:t>Mengenangaben) die Fehlerursache sind, gibt </a:t>
+              <a:t> (einzelne Zeichen, Abkürzungen, Mengenangaben) die Fehlerursache sind, gibt </a:t>
             </a:r>
             <a:r>
               <a:rPr lang="de-DE" sz="1400" dirty="0" err="1">
@@ -21853,12 +21752,6 @@
               </a:rPr>
               <a:t> </a:t>
             </a:r>
-            <a:endParaRPr lang="de-DE" sz="2000" dirty="0">
-              <a:solidFill>
-                <a:srgbClr val="000000"/>
-              </a:solidFill>
-              <a:latin typeface="Arial" charset="0"/>
-            </a:endParaRPr>
           </a:p>
           <a:p>
             <a:pPr marL="800067" lvl="1" indent="-342878" algn="l">
@@ -22028,12 +21921,6 @@
               </a:rPr>
               <a:t>Beispiele:</a:t>
             </a:r>
-            <a:endParaRPr lang="de-DE" sz="2000" dirty="0">
-              <a:solidFill>
-                <a:srgbClr val="000000"/>
-              </a:solidFill>
-              <a:latin typeface="Arial" charset="0"/>
-            </a:endParaRPr>
           </a:p>
           <a:p>
             <a:pPr marL="800067" lvl="1" indent="-342878" algn="l">
@@ -23159,7 +23046,16 @@
                 </a:solidFill>
                 <a:latin typeface="Arial" charset="0"/>
               </a:rPr>
-              <a:t> </a:t>
+              <a:t> Table, ähnlich der </a:t>
+            </a:r>
+            <a:r>
+              <a:rPr lang="de-DE" sz="1600" dirty="0" err="1">
+                <a:solidFill>
+                  <a:srgbClr val="000000"/>
+                </a:solidFill>
+                <a:latin typeface="Arial" charset="0"/>
+              </a:rPr>
+              <a:t>Association</a:t>
             </a:r>
             <a:r>
               <a:rPr lang="de-DE" sz="1600" dirty="0">
@@ -23168,34 +23064,7 @@
                 </a:solidFill>
                 <a:latin typeface="Arial" charset="0"/>
               </a:rPr>
-              <a:t>Table, ähnlich der </a:t>
-            </a:r>
-            <a:r>
-              <a:rPr lang="de-DE" sz="1600" dirty="0" err="1">
-                <a:solidFill>
-                  <a:srgbClr val="000000"/>
-                </a:solidFill>
-                <a:latin typeface="Arial" charset="0"/>
-              </a:rPr>
-              <a:t>Association</a:t>
-            </a:r>
-            <a:r>
-              <a:rPr lang="de-DE" sz="1600" dirty="0">
-                <a:solidFill>
-                  <a:srgbClr val="000000"/>
-                </a:solidFill>
-                <a:latin typeface="Arial" charset="0"/>
-              </a:rPr>
-              <a:t> </a:t>
-            </a:r>
-            <a:r>
-              <a:rPr lang="de-DE" sz="1600" dirty="0">
-                <a:solidFill>
-                  <a:srgbClr val="000000"/>
-                </a:solidFill>
-                <a:latin typeface="Arial" charset="0"/>
-              </a:rPr>
-              <a:t>Rules eines Frameworks.</a:t>
+              <a:t> Rules eines Frameworks.</a:t>
             </a:r>
           </a:p>
           <a:p>
@@ -24846,9 +24715,6 @@
               </a:rPr>
               <a:t>Blick über den Tellerrand</a:t>
             </a:r>
-            <a:endParaRPr lang="de-DE" sz="3600" dirty="0">
-              <a:latin typeface="TheSansOffice" pitchFamily="34" charset="0"/>
-            </a:endParaRPr>
           </a:p>
         </p:txBody>
       </p:sp>
@@ -25971,9 +25837,6 @@
               </a:rPr>
               <a:t>Nächste Ziele</a:t>
             </a:r>
-            <a:endParaRPr lang="de-DE" sz="3600" dirty="0">
-              <a:latin typeface="TheSansOffice" pitchFamily="34" charset="0"/>
-            </a:endParaRPr>
           </a:p>
         </p:txBody>
       </p:sp>
@@ -26129,16 +25992,7 @@
                 </a:solidFill>
                 <a:latin typeface="Arial" charset="0"/>
               </a:rPr>
-              <a:t> </a:t>
-            </a:r>
-            <a:r>
-              <a:rPr lang="de-DE" sz="2000" dirty="0">
-                <a:solidFill>
-                  <a:srgbClr val="000000"/>
-                </a:solidFill>
-                <a:latin typeface="Arial" charset="0"/>
-              </a:rPr>
-              <a:t>2016</a:t>
+              <a:t> 2016</a:t>
             </a:r>
           </a:p>
           <a:p>
@@ -26282,25 +26136,7 @@
                 </a:solidFill>
                 <a:latin typeface="Arial" charset="0"/>
               </a:rPr>
-              <a:t>Eclipse</a:t>
-            </a:r>
-            <a:r>
-              <a:rPr lang="de-DE" sz="1600" dirty="0" err="1">
-                <a:solidFill>
-                  <a:srgbClr val="000000"/>
-                </a:solidFill>
-                <a:latin typeface="Arial" charset="0"/>
-              </a:rPr>
-              <a:t>-</a:t>
-            </a:r>
-            <a:r>
-              <a:rPr lang="de-DE" sz="1600" dirty="0" err="1">
-                <a:solidFill>
-                  <a:srgbClr val="000000"/>
-                </a:solidFill>
-                <a:latin typeface="Arial" charset="0"/>
-              </a:rPr>
-              <a:t>Plugin</a:t>
+              <a:t>Eclipse-Plugin</a:t>
             </a:r>
             <a:r>
               <a:rPr lang="de-DE" sz="1600" dirty="0">
@@ -26786,9 +26622,6 @@
               </a:rPr>
               <a:t>Weitere Links</a:t>
             </a:r>
-            <a:endParaRPr lang="de-DE" sz="3600" dirty="0">
-              <a:latin typeface="TheSansOffice" pitchFamily="34" charset="0"/>
-            </a:endParaRPr>
           </a:p>
         </p:txBody>
       </p:sp>
@@ -26987,17 +26820,7 @@
                 <a:latin typeface="Arial" charset="0"/>
                 <a:hlinkClick r:id="rId5"/>
               </a:rPr>
-              <a:t>https</a:t>
-            </a:r>
-            <a:r>
-              <a:rPr lang="de-DE" sz="1600" dirty="0">
-                <a:solidFill>
-                  <a:srgbClr val="000000"/>
-                </a:solidFill>
-                <a:latin typeface="Arial" charset="0"/>
-                <a:hlinkClick r:id="rId5"/>
-              </a:rPr>
-              <a:t>://github.com/nkutsche/SchematronQuickFix-2017-11-17</a:t>
+              <a:t>https://github.com/nkutsche/SchematronQuickFix-2017-11-17</a:t>
             </a:r>
             <a:endParaRPr lang="de-DE" sz="1600" dirty="0">
               <a:solidFill>
@@ -27269,18 +27092,7 @@
                 <a:ea typeface="+mj-ea"/>
                 <a:cs typeface="+mj-cs"/>
               </a:rPr>
-              <a:t>Fragen</a:t>
-            </a:r>
-            <a:r>
-              <a:rPr lang="de-DE" sz="3600" b="1" dirty="0">
-                <a:solidFill>
-                  <a:srgbClr val="000077"/>
-                </a:solidFill>
-                <a:latin typeface="TheSansOffice" pitchFamily="34" charset="0"/>
-                <a:ea typeface="+mj-ea"/>
-                <a:cs typeface="+mj-cs"/>
-              </a:rPr>
-              <a:t>?</a:t>
+              <a:t>Fragen?</a:t>
             </a:r>
           </a:p>
         </p:txBody>
@@ -27357,9 +27169,6 @@
               </a:rPr>
               <a:t>Entstehungsgeschichte</a:t>
             </a:r>
-            <a:endParaRPr lang="de-DE" sz="3600" dirty="0">
-              <a:latin typeface="TheSansOffice" pitchFamily="34" charset="0"/>
-            </a:endParaRPr>
           </a:p>
         </p:txBody>
       </p:sp>
@@ -28228,9 +28037,6 @@
               </a:rPr>
               <a:t>Entstehungsgeschichte</a:t>
             </a:r>
-            <a:endParaRPr lang="de-DE" sz="3600" dirty="0">
-              <a:latin typeface="TheSansOffice" pitchFamily="34" charset="0"/>
-            </a:endParaRPr>
           </a:p>
         </p:txBody>
       </p:sp>
@@ -28247,7 +28053,7 @@
         <p:spPr>
           <a:xfrm>
             <a:off x="936640" y="1705991"/>
-            <a:ext cx="7190581" cy="5602636"/>
+            <a:ext cx="8031792" cy="5602636"/>
           </a:xfrm>
         </p:spPr>
         <p:txBody>
@@ -28314,16 +28120,79 @@
                 </a:solidFill>
                 <a:latin typeface="Arial" charset="0"/>
               </a:rPr>
-              <a:t> auf der XML </a:t>
-            </a:r>
-            <a:r>
-              <a:rPr lang="de-DE" sz="1600" dirty="0" err="1">
+              <a:t> </a:t>
+            </a:r>
+            <a:r>
+              <a:rPr lang="de-DE" sz="1600" dirty="0" smtClean="0">
+                <a:solidFill>
+                  <a:srgbClr val="000000"/>
+                </a:solidFill>
+                <a:latin typeface="Arial" charset="0"/>
+              </a:rPr>
+              <a:t>am </a:t>
+            </a:r>
+            <a:r>
+              <a:rPr lang="de-DE" sz="1600" dirty="0" err="1" smtClean="0">
+                <a:solidFill>
+                  <a:srgbClr val="000000"/>
+                </a:solidFill>
+                <a:latin typeface="Arial" charset="0"/>
+              </a:rPr>
+              <a:t>PreConfDay</a:t>
+            </a:r>
+            <a:r>
+              <a:rPr lang="de-DE" sz="1600" dirty="0" smtClean="0">
+                <a:solidFill>
+                  <a:srgbClr val="000000"/>
+                </a:solidFill>
+                <a:latin typeface="Arial" charset="0"/>
+              </a:rPr>
+              <a:t> der </a:t>
+            </a:r>
+            <a:r>
+              <a:rPr lang="de-DE" sz="1600" dirty="0">
+                <a:solidFill>
+                  <a:srgbClr val="000000"/>
+                </a:solidFill>
+                <a:latin typeface="Arial" charset="0"/>
+              </a:rPr>
+              <a:t>XML </a:t>
+            </a:r>
+            <a:r>
+              <a:rPr lang="de-DE" sz="1600" dirty="0" err="1" smtClean="0">
                 <a:solidFill>
                   <a:srgbClr val="000000"/>
                 </a:solidFill>
                 <a:latin typeface="Arial" charset="0"/>
               </a:rPr>
               <a:t>Prauge</a:t>
+            </a:r>
+            <a:r>
+              <a:rPr lang="de-DE" sz="1600" dirty="0">
+                <a:solidFill>
+                  <a:srgbClr val="000000"/>
+                </a:solidFill>
+                <a:latin typeface="Arial" charset="0"/>
+              </a:rPr>
+              <a:t> </a:t>
+            </a:r>
+            <a:r>
+              <a:rPr lang="de-DE" sz="1600" dirty="0" smtClean="0">
+                <a:solidFill>
+                  <a:srgbClr val="000000"/>
+                </a:solidFill>
+                <a:latin typeface="Arial" charset="0"/>
+              </a:rPr>
+              <a:t>zusammen mit Octavian </a:t>
+            </a:r>
+            <a:r>
+              <a:rPr lang="de-DE" sz="1600" dirty="0" err="1" smtClean="0">
+                <a:solidFill>
+                  <a:srgbClr val="000000"/>
+                </a:solidFill>
+                <a:latin typeface="Arial" charset="0"/>
+              </a:rPr>
+              <a:t>Nadolu</a:t>
             </a:r>
             <a:endParaRPr lang="de-DE" sz="1600" dirty="0">
               <a:solidFill>
@@ -28455,8 +28324,23 @@
                 </a:solidFill>
                 <a:latin typeface="Arial" charset="0"/>
               </a:rPr>
-              <a:t> (Hauptkonferenz)</a:t>
-            </a:r>
+              <a:t> (Hauptkonferenz</a:t>
+            </a:r>
+            <a:r>
+              <a:rPr lang="de-DE" sz="1600" dirty="0" smtClean="0">
+                <a:solidFill>
+                  <a:srgbClr val="000000"/>
+                </a:solidFill>
+                <a:latin typeface="Arial" charset="0"/>
+              </a:rPr>
+              <a:t>) mit Octavian</a:t>
+            </a:r>
+            <a:endParaRPr lang="de-DE" sz="1600" dirty="0">
+              <a:solidFill>
+                <a:srgbClr val="000000"/>
+              </a:solidFill>
+              <a:latin typeface="Arial" charset="0"/>
+            </a:endParaRPr>
           </a:p>
           <a:p>
             <a:pPr marL="342878" indent="-342878" algn="l">
@@ -28692,26 +28576,23 @@
               <a:buChar char="•"/>
             </a:pPr>
             <a:r>
-              <a:rPr lang="de-DE" sz="2000" dirty="0">
-                <a:solidFill>
-                  <a:srgbClr val="000000"/>
-                </a:solidFill>
-                <a:latin typeface="Arial" charset="0"/>
-              </a:rPr>
-              <a:t>2018</a:t>
-            </a:r>
-          </a:p>
-          <a:p>
-            <a:pPr marL="800067" lvl="1" indent="-342878" algn="l">
-              <a:lnSpc>
-                <a:spcPct val="150000"/>
-              </a:lnSpc>
-              <a:spcBef>
-                <a:spcPct val="0"/>
-              </a:spcBef>
-              <a:buFont typeface="Arial" pitchFamily="34" charset="0"/>
-              <a:buChar char="•"/>
-            </a:pPr>
+              <a:rPr lang="de-DE" sz="2000" dirty="0" smtClean="0">
+                <a:solidFill>
+                  <a:srgbClr val="000000"/>
+                </a:solidFill>
+                <a:latin typeface="Arial" charset="0"/>
+              </a:rPr>
+              <a:t>2018 – </a:t>
+            </a:r>
+            <a:r>
+              <a:rPr lang="de-DE" sz="1600" dirty="0" smtClean="0">
+                <a:solidFill>
+                  <a:srgbClr val="000000"/>
+                </a:solidFill>
+                <a:latin typeface="Arial" charset="0"/>
+              </a:rPr>
+              <a:t>Standard </a:t>
+            </a:r>
             <a:r>
               <a:rPr lang="de-DE" sz="1600" dirty="0">
                 <a:solidFill>
@@ -28719,7 +28600,7 @@
                 </a:solidFill>
                 <a:latin typeface="Arial" charset="0"/>
               </a:rPr>
-              <a:t>Standard abschließen?</a:t>
+              <a:t>abschließen?</a:t>
             </a:r>
           </a:p>
         </p:txBody>
@@ -28754,6 +28635,9 @@
                     <p:cTn id="3" fill="hold">
                       <p:stCondLst>
                         <p:cond delay="indefinite"/>
+                        <p:cond evt="onBegin" delay="0">
+                          <p:tn val="2"/>
+                        </p:cond>
                       </p:stCondLst>
                       <p:childTnLst>
                         <p:par>
@@ -28763,7 +28647,7 @@
                             </p:stCondLst>
                             <p:childTnLst>
                               <p:par>
-                                <p:cTn id="5" presetID="1" presetClass="entr" presetSubtype="0" fill="hold" nodeType="clickEffect">
+                                <p:cTn id="5" presetID="1" presetClass="entr" presetSubtype="0" fill="hold" nodeType="withEffect">
                                   <p:stCondLst>
                                     <p:cond delay="0"/>
                                   </p:stCondLst>
@@ -29229,37 +29113,6 @@
                                   </p:childTnLst>
                                 </p:cTn>
                               </p:par>
-                              <p:par>
-                                <p:cTn id="41" presetID="1" presetClass="entr" presetSubtype="0" fill="hold" nodeType="withEffect">
-                                  <p:stCondLst>
-                                    <p:cond delay="0"/>
-                                  </p:stCondLst>
-                                  <p:childTnLst>
-                                    <p:set>
-                                      <p:cBhvr>
-                                        <p:cTn id="42" dur="1" fill="hold">
-                                          <p:stCondLst>
-                                            <p:cond delay="0"/>
-                                          </p:stCondLst>
-                                        </p:cTn>
-                                        <p:tgtEl>
-                                          <p:spTgt spid="4098">
-                                            <p:txEl>
-                                              <p:pRg st="11" end="11"/>
-                                            </p:txEl>
-                                          </p:spTgt>
-                                        </p:tgtEl>
-                                        <p:attrNameLst>
-                                          <p:attrName>style.visibility</p:attrName>
-                                        </p:attrNameLst>
-                                      </p:cBhvr>
-                                      <p:to>
-                                        <p:strVal val="visible"/>
-                                      </p:to>
-                                    </p:set>
-                                  </p:childTnLst>
-                                </p:cTn>
-                              </p:par>
                             </p:childTnLst>
                           </p:cTn>
                         </p:par>
@@ -29351,14 +29204,6 @@
               </a:rPr>
               <a:t>Die Sprache</a:t>
             </a:r>
-            <a:endParaRPr lang="de-DE" sz="3600" b="1" dirty="0">
-              <a:solidFill>
-                <a:srgbClr val="000077"/>
-              </a:solidFill>
-              <a:latin typeface="TheSansOffice" pitchFamily="34" charset="0"/>
-              <a:ea typeface="+mj-ea"/>
-              <a:cs typeface="+mj-cs"/>
-            </a:endParaRPr>
           </a:p>
         </p:txBody>
       </p:sp>
@@ -29434,9 +29279,6 @@
               </a:rPr>
               <a:t>Grundkonzepte</a:t>
             </a:r>
-            <a:endParaRPr lang="de-DE" sz="3600" dirty="0">
-              <a:latin typeface="TheSansOffice" pitchFamily="34" charset="0"/>
-            </a:endParaRPr>
           </a:p>
         </p:txBody>
       </p:sp>
@@ -31927,9 +31769,6 @@
               </a:rPr>
               <a:t>Act – Aktionen ausführen</a:t>
             </a:r>
-            <a:endParaRPr lang="de-DE" sz="3600" dirty="0">
-              <a:latin typeface="TheSansOffice" pitchFamily="34" charset="0"/>
-            </a:endParaRPr>
           </a:p>
         </p:txBody>
       </p:sp>

</xml_diff>